<commit_message>
powerpoint + add text on images
</commit_message>
<xml_diff>
--- a/Merme Generator 3000.pptx
+++ b/Merme Generator 3000.pptx
@@ -8,8 +8,9 @@
     <p:sldId id="256" r:id="rId5"/>
     <p:sldId id="268" r:id="rId6"/>
     <p:sldId id="273" r:id="rId7"/>
-    <p:sldId id="265" r:id="rId8"/>
-    <p:sldId id="272" r:id="rId9"/>
+    <p:sldId id="278" r:id="rId8"/>
+    <p:sldId id="275" r:id="rId9"/>
+    <p:sldId id="272" r:id="rId10"/>
   </p:sldIdLst>
   <p:sldSz cx="12192000" cy="6858000"/>
   <p:notesSz cx="6858000" cy="9144000"/>
@@ -3230,7 +3231,7 @@
           <a:p>
             <a:fld id="{81813ECF-EE14-4E27-B80C-FD5434B1F568}" type="datetimeFigureOut">
               <a:rPr lang="fr-FR" smtClean="0"/>
-              <a:t>28/03/2022</a:t>
+              <a:t>31/03/2022</a:t>
             </a:fld>
             <a:endParaRPr lang="fr-FR"/>
           </a:p>
@@ -3430,7 +3431,7 @@
           <a:p>
             <a:fld id="{81813ECF-EE14-4E27-B80C-FD5434B1F568}" type="datetimeFigureOut">
               <a:rPr lang="fr-FR" smtClean="0"/>
-              <a:t>28/03/2022</a:t>
+              <a:t>31/03/2022</a:t>
             </a:fld>
             <a:endParaRPr lang="fr-FR"/>
           </a:p>
@@ -3640,7 +3641,7 @@
           <a:p>
             <a:fld id="{81813ECF-EE14-4E27-B80C-FD5434B1F568}" type="datetimeFigureOut">
               <a:rPr lang="fr-FR" smtClean="0"/>
-              <a:t>28/03/2022</a:t>
+              <a:t>31/03/2022</a:t>
             </a:fld>
             <a:endParaRPr lang="fr-FR"/>
           </a:p>
@@ -3840,7 +3841,7 @@
           <a:p>
             <a:fld id="{81813ECF-EE14-4E27-B80C-FD5434B1F568}" type="datetimeFigureOut">
               <a:rPr lang="fr-FR" smtClean="0"/>
-              <a:t>28/03/2022</a:t>
+              <a:t>31/03/2022</a:t>
             </a:fld>
             <a:endParaRPr lang="fr-FR"/>
           </a:p>
@@ -4116,7 +4117,7 @@
           <a:p>
             <a:fld id="{81813ECF-EE14-4E27-B80C-FD5434B1F568}" type="datetimeFigureOut">
               <a:rPr lang="fr-FR" smtClean="0"/>
-              <a:t>28/03/2022</a:t>
+              <a:t>31/03/2022</a:t>
             </a:fld>
             <a:endParaRPr lang="fr-FR"/>
           </a:p>
@@ -4384,7 +4385,7 @@
           <a:p>
             <a:fld id="{81813ECF-EE14-4E27-B80C-FD5434B1F568}" type="datetimeFigureOut">
               <a:rPr lang="fr-FR" smtClean="0"/>
-              <a:t>28/03/2022</a:t>
+              <a:t>31/03/2022</a:t>
             </a:fld>
             <a:endParaRPr lang="fr-FR"/>
           </a:p>
@@ -4799,7 +4800,7 @@
           <a:p>
             <a:fld id="{81813ECF-EE14-4E27-B80C-FD5434B1F568}" type="datetimeFigureOut">
               <a:rPr lang="fr-FR" smtClean="0"/>
-              <a:t>28/03/2022</a:t>
+              <a:t>31/03/2022</a:t>
             </a:fld>
             <a:endParaRPr lang="fr-FR"/>
           </a:p>
@@ -4941,7 +4942,7 @@
           <a:p>
             <a:fld id="{81813ECF-EE14-4E27-B80C-FD5434B1F568}" type="datetimeFigureOut">
               <a:rPr lang="fr-FR" smtClean="0"/>
-              <a:t>28/03/2022</a:t>
+              <a:t>31/03/2022</a:t>
             </a:fld>
             <a:endParaRPr lang="fr-FR"/>
           </a:p>
@@ -5054,7 +5055,7 @@
           <a:p>
             <a:fld id="{81813ECF-EE14-4E27-B80C-FD5434B1F568}" type="datetimeFigureOut">
               <a:rPr lang="fr-FR" smtClean="0"/>
-              <a:t>28/03/2022</a:t>
+              <a:t>31/03/2022</a:t>
             </a:fld>
             <a:endParaRPr lang="fr-FR"/>
           </a:p>
@@ -5367,7 +5368,7 @@
           <a:p>
             <a:fld id="{81813ECF-EE14-4E27-B80C-FD5434B1F568}" type="datetimeFigureOut">
               <a:rPr lang="fr-FR" smtClean="0"/>
-              <a:t>28/03/2022</a:t>
+              <a:t>31/03/2022</a:t>
             </a:fld>
             <a:endParaRPr lang="fr-FR"/>
           </a:p>
@@ -5656,7 +5657,7 @@
           <a:p>
             <a:fld id="{81813ECF-EE14-4E27-B80C-FD5434B1F568}" type="datetimeFigureOut">
               <a:rPr lang="fr-FR" smtClean="0"/>
-              <a:t>28/03/2022</a:t>
+              <a:t>31/03/2022</a:t>
             </a:fld>
             <a:endParaRPr lang="fr-FR"/>
           </a:p>
@@ -5899,7 +5900,7 @@
           <a:p>
             <a:fld id="{81813ECF-EE14-4E27-B80C-FD5434B1F568}" type="datetimeFigureOut">
               <a:rPr lang="fr-FR" smtClean="0"/>
-              <a:t>28/03/2022</a:t>
+              <a:t>31/03/2022</a:t>
             </a:fld>
             <a:endParaRPr lang="fr-FR"/>
           </a:p>
@@ -6671,8 +6672,8 @@
         </p:blipFill>
         <p:spPr>
           <a:xfrm>
-            <a:off x="5984216" y="3819697"/>
-            <a:ext cx="3818013" cy="3320011"/>
+            <a:off x="6328594" y="4025828"/>
+            <a:ext cx="3113602" cy="2707480"/>
           </a:xfrm>
           <a:prstGeom prst="rect">
             <a:avLst/>
@@ -6787,7 +6788,7 @@
         </p:blipFill>
         <p:spPr>
           <a:xfrm>
-            <a:off x="5968561" y="0"/>
+            <a:off x="5968561" y="96080"/>
             <a:ext cx="3833668" cy="3833668"/>
           </a:xfrm>
           <a:prstGeom prst="rect">
@@ -6965,10 +6966,10 @@
       </p:grpSpPr>
       <p:pic>
         <p:nvPicPr>
-          <p:cNvPr id="5" name="Picture 4" descr="Shape&#10;&#10;Description automatically generated">
-            <a:extLst>
-              <a:ext uri="{FF2B5EF4-FFF2-40B4-BE49-F238E27FC236}">
-                <a16:creationId xmlns:a16="http://schemas.microsoft.com/office/drawing/2014/main" id="{539A90C0-14AE-4553-94B9-745D489894F4}"/>
+          <p:cNvPr id="9" name="Picture 8" descr="A picture containing accessory&#10;&#10;Description automatically generated">
+            <a:extLst>
+              <a:ext uri="{FF2B5EF4-FFF2-40B4-BE49-F238E27FC236}">
+                <a16:creationId xmlns:a16="http://schemas.microsoft.com/office/drawing/2014/main" id="{CD708987-D64C-4321-85DA-D29D12FE43E5}"/>
               </a:ext>
             </a:extLst>
           </p:cNvPr>
@@ -6991,65 +6992,14 @@
         </p:blipFill>
         <p:spPr>
           <a:xfrm>
-            <a:off x="0" y="0"/>
-            <a:ext cx="12373476" cy="7143750"/>
+            <a:off x="0" y="-1"/>
+            <a:ext cx="12490462" cy="7139709"/>
           </a:xfrm>
           <a:prstGeom prst="rect">
             <a:avLst/>
           </a:prstGeom>
         </p:spPr>
       </p:pic>
-      <p:sp>
-        <p:nvSpPr>
-          <p:cNvPr id="6" name="Rectangle 5">
-            <a:extLst>
-              <a:ext uri="{FF2B5EF4-FFF2-40B4-BE49-F238E27FC236}">
-                <a16:creationId xmlns:a16="http://schemas.microsoft.com/office/drawing/2014/main" id="{41E8CB49-2B09-4A05-8ED0-32089D0D7507}"/>
-              </a:ext>
-            </a:extLst>
-          </p:cNvPr>
-          <p:cNvSpPr/>
-          <p:nvPr/>
-        </p:nvSpPr>
-        <p:spPr>
-          <a:xfrm>
-            <a:off x="0" y="0"/>
-            <a:ext cx="12544425" cy="7058025"/>
-          </a:xfrm>
-          <a:prstGeom prst="rect">
-            <a:avLst/>
-          </a:prstGeom>
-          <a:solidFill>
-            <a:srgbClr val="000000">
-              <a:alpha val="36078"/>
-            </a:srgbClr>
-          </a:solidFill>
-        </p:spPr>
-        <p:style>
-          <a:lnRef idx="2">
-            <a:schemeClr val="accent1">
-              <a:shade val="50000"/>
-            </a:schemeClr>
-          </a:lnRef>
-          <a:fillRef idx="1">
-            <a:schemeClr val="accent1"/>
-          </a:fillRef>
-          <a:effectRef idx="0">
-            <a:schemeClr val="accent1"/>
-          </a:effectRef>
-          <a:fontRef idx="minor">
-            <a:schemeClr val="lt1"/>
-          </a:fontRef>
-        </p:style>
-        <p:txBody>
-          <a:bodyPr rtlCol="0" anchor="ctr"/>
-          <a:lstStyle/>
-          <a:p>
-            <a:pPr algn="ctr"/>
-            <a:endParaRPr lang="fr-FR"/>
-          </a:p>
-        </p:txBody>
-      </p:sp>
       <p:sp>
         <p:nvSpPr>
           <p:cNvPr id="2" name="Title 1">
@@ -7081,17 +7031,142 @@
             <a:pPr algn="ctr"/>
             <a:r>
               <a:rPr lang="en-GB" sz="7000" dirty="0">
-                <a:solidFill>
-                  <a:schemeClr val="bg1"/>
-                </a:solidFill>
                 <a:latin typeface="Impact" panose="020B0806030902050204" pitchFamily="34" charset="0"/>
               </a:rPr>
-              <a:t>My concerns</a:t>
+              <a:t>Tools</a:t>
             </a:r>
             <a:endParaRPr lang="fr-FR" sz="7000" dirty="0">
-              <a:solidFill>
-                <a:schemeClr val="bg1"/>
-              </a:solidFill>
+              <a:latin typeface="Impact" panose="020B0806030902050204" pitchFamily="34" charset="0"/>
+            </a:endParaRPr>
+          </a:p>
+        </p:txBody>
+      </p:sp>
+      <p:pic>
+        <p:nvPicPr>
+          <p:cNvPr id="10" name="Picture 9" descr="A picture containing vector graphics&#10;&#10;Description automatically generated">
+            <a:extLst>
+              <a:ext uri="{FF2B5EF4-FFF2-40B4-BE49-F238E27FC236}">
+                <a16:creationId xmlns:a16="http://schemas.microsoft.com/office/drawing/2014/main" id="{1CBD5E8E-797F-42E7-B99F-5850F6445FA2}"/>
+              </a:ext>
+            </a:extLst>
+          </p:cNvPr>
+          <p:cNvPicPr>
+            <a:picLocks noChangeAspect="1"/>
+          </p:cNvPicPr>
+          <p:nvPr/>
+        </p:nvPicPr>
+        <p:blipFill>
+          <a:blip r:embed="rId3">
+            <a:extLst>
+              <a:ext uri="{28A0092B-C50C-407E-A947-70E740481C1C}">
+                <a14:useLocalDpi xmlns:a14="http://schemas.microsoft.com/office/drawing/2010/main" val="0"/>
+              </a:ext>
+            </a:extLst>
+          </a:blip>
+          <a:stretch>
+            <a:fillRect/>
+          </a:stretch>
+        </p:blipFill>
+        <p:spPr>
+          <a:xfrm>
+            <a:off x="8466491" y="2752436"/>
+            <a:ext cx="1981124" cy="1981124"/>
+          </a:xfrm>
+          <a:prstGeom prst="rect">
+            <a:avLst/>
+          </a:prstGeom>
+        </p:spPr>
+      </p:pic>
+      <p:pic>
+        <p:nvPicPr>
+          <p:cNvPr id="12" name="Picture 11" descr="A black and white logo&#10;&#10;Description automatically generated with low confidence">
+            <a:extLst>
+              <a:ext uri="{FF2B5EF4-FFF2-40B4-BE49-F238E27FC236}">
+                <a16:creationId xmlns:a16="http://schemas.microsoft.com/office/drawing/2014/main" id="{0FCF7F26-A84E-4DCF-80EC-1F4495DB53D8}"/>
+              </a:ext>
+            </a:extLst>
+          </p:cNvPr>
+          <p:cNvPicPr>
+            <a:picLocks noChangeAspect="1"/>
+          </p:cNvPicPr>
+          <p:nvPr/>
+        </p:nvPicPr>
+        <p:blipFill>
+          <a:blip r:embed="rId4">
+            <a:extLst>
+              <a:ext uri="{28A0092B-C50C-407E-A947-70E740481C1C}">
+                <a14:useLocalDpi xmlns:a14="http://schemas.microsoft.com/office/drawing/2010/main" val="0"/>
+              </a:ext>
+            </a:extLst>
+          </a:blip>
+          <a:stretch>
+            <a:fillRect/>
+          </a:stretch>
+        </p:blipFill>
+        <p:spPr>
+          <a:xfrm>
+            <a:off x="771525" y="2752436"/>
+            <a:ext cx="4632703" cy="1706379"/>
+          </a:xfrm>
+          <a:prstGeom prst="rect">
+            <a:avLst/>
+          </a:prstGeom>
+        </p:spPr>
+      </p:pic>
+      <p:sp>
+        <p:nvSpPr>
+          <p:cNvPr id="14" name="Title 1">
+            <a:extLst>
+              <a:ext uri="{FF2B5EF4-FFF2-40B4-BE49-F238E27FC236}">
+                <a16:creationId xmlns:a16="http://schemas.microsoft.com/office/drawing/2014/main" id="{C175A123-044D-4030-A31E-E2E94031C195}"/>
+              </a:ext>
+            </a:extLst>
+          </p:cNvPr>
+          <p:cNvSpPr txBox="1">
+            <a:spLocks/>
+          </p:cNvSpPr>
+          <p:nvPr/>
+        </p:nvSpPr>
+        <p:spPr>
+          <a:xfrm>
+            <a:off x="6422597" y="3185392"/>
+            <a:ext cx="1025525" cy="1106488"/>
+          </a:xfrm>
+          <a:prstGeom prst="rect">
+            <a:avLst/>
+          </a:prstGeom>
+        </p:spPr>
+        <p:txBody>
+          <a:bodyPr vert="horz" lIns="91440" tIns="45720" rIns="91440" bIns="45720" rtlCol="0" anchor="ctr">
+            <a:noAutofit/>
+          </a:bodyPr>
+          <a:lstStyle>
+            <a:lvl1pPr algn="l" defTabSz="914400" rtl="0" eaLnBrk="1" latinLnBrk="0" hangingPunct="1">
+              <a:lnSpc>
+                <a:spcPct val="90000"/>
+              </a:lnSpc>
+              <a:spcBef>
+                <a:spcPct val="0"/>
+              </a:spcBef>
+              <a:buNone/>
+              <a:defRPr sz="4400" kern="1200">
+                <a:solidFill>
+                  <a:schemeClr val="tx1"/>
+                </a:solidFill>
+                <a:latin typeface="+mj-lt"/>
+                <a:ea typeface="+mj-ea"/>
+                <a:cs typeface="+mj-cs"/>
+              </a:defRPr>
+            </a:lvl1pPr>
+          </a:lstStyle>
+          <a:p>
+            <a:r>
+              <a:rPr lang="en-GB" sz="12500" dirty="0">
+                <a:latin typeface="Impact" panose="020B0806030902050204" pitchFamily="34" charset="0"/>
+              </a:rPr>
+              <a:t>+</a:t>
+            </a:r>
+            <a:endParaRPr lang="fr-FR" sz="12500" dirty="0">
               <a:latin typeface="Impact" panose="020B0806030902050204" pitchFamily="34" charset="0"/>
             </a:endParaRPr>
           </a:p>
@@ -7100,7 +7175,7 @@
     </p:spTree>
     <p:extLst>
       <p:ext uri="{BB962C8B-B14F-4D97-AF65-F5344CB8AC3E}">
-        <p14:creationId xmlns:p14="http://schemas.microsoft.com/office/powerpoint/2010/main" val="3491313823"/>
+        <p14:creationId xmlns:p14="http://schemas.microsoft.com/office/powerpoint/2010/main" val="2021828161"/>
       </p:ext>
     </p:extLst>
   </p:cSld>
@@ -7111,6 +7186,149 @@
 </file>
 
 <file path=ppt/slides/slide5.xml><?xml version="1.0" encoding="utf-8"?>
+<p:sld xmlns:a="http://schemas.openxmlformats.org/drawingml/2006/main" xmlns:r="http://schemas.openxmlformats.org/officeDocument/2006/relationships" xmlns:p="http://schemas.openxmlformats.org/presentationml/2006/main">
+  <p:cSld>
+    <p:spTree>
+      <p:nvGrpSpPr>
+        <p:cNvPr id="1" name=""/>
+        <p:cNvGrpSpPr/>
+        <p:nvPr/>
+      </p:nvGrpSpPr>
+      <p:grpSpPr>
+        <a:xfrm>
+          <a:off x="0" y="0"/>
+          <a:ext cx="0" cy="0"/>
+          <a:chOff x="0" y="0"/>
+          <a:chExt cx="0" cy="0"/>
+        </a:xfrm>
+      </p:grpSpPr>
+      <p:pic>
+        <p:nvPicPr>
+          <p:cNvPr id="7" name="Picture 6" descr="A picture containing accessory&#10;&#10;Description automatically generated">
+            <a:extLst>
+              <a:ext uri="{FF2B5EF4-FFF2-40B4-BE49-F238E27FC236}">
+                <a16:creationId xmlns:a16="http://schemas.microsoft.com/office/drawing/2014/main" id="{2E6EF74B-FB38-4828-81C0-F689B78F77E3}"/>
+              </a:ext>
+            </a:extLst>
+          </p:cNvPr>
+          <p:cNvPicPr>
+            <a:picLocks noChangeAspect="1"/>
+          </p:cNvPicPr>
+          <p:nvPr/>
+        </p:nvPicPr>
+        <p:blipFill>
+          <a:blip r:embed="rId2">
+            <a:extLst>
+              <a:ext uri="{28A0092B-C50C-407E-A947-70E740481C1C}">
+                <a14:useLocalDpi xmlns:a14="http://schemas.microsoft.com/office/drawing/2010/main" val="0"/>
+              </a:ext>
+            </a:extLst>
+          </a:blip>
+          <a:stretch>
+            <a:fillRect/>
+          </a:stretch>
+        </p:blipFill>
+        <p:spPr>
+          <a:xfrm>
+            <a:off x="0" y="-1"/>
+            <a:ext cx="12490462" cy="7139709"/>
+          </a:xfrm>
+          <a:prstGeom prst="rect">
+            <a:avLst/>
+          </a:prstGeom>
+        </p:spPr>
+      </p:pic>
+      <p:sp>
+        <p:nvSpPr>
+          <p:cNvPr id="2" name="Title 1">
+            <a:extLst>
+              <a:ext uri="{FF2B5EF4-FFF2-40B4-BE49-F238E27FC236}">
+                <a16:creationId xmlns:a16="http://schemas.microsoft.com/office/drawing/2014/main" id="{9BB540AD-93E7-4DF0-B9EF-E4B4DE76ABAE}"/>
+              </a:ext>
+            </a:extLst>
+          </p:cNvPr>
+          <p:cNvSpPr>
+            <a:spLocks noGrp="1"/>
+          </p:cNvSpPr>
+          <p:nvPr>
+            <p:ph type="title"/>
+          </p:nvPr>
+        </p:nvSpPr>
+        <p:spPr>
+          <a:xfrm>
+            <a:off x="771525" y="0"/>
+            <a:ext cx="10515600" cy="1325563"/>
+          </a:xfrm>
+        </p:spPr>
+        <p:txBody>
+          <a:bodyPr>
+            <a:normAutofit/>
+          </a:bodyPr>
+          <a:lstStyle/>
+          <a:p>
+            <a:pPr algn="ctr"/>
+            <a:r>
+              <a:rPr lang="en-GB" sz="7000" dirty="0">
+                <a:latin typeface="Impact" panose="020B0806030902050204" pitchFamily="34" charset="0"/>
+              </a:rPr>
+              <a:t>Protype</a:t>
+            </a:r>
+            <a:endParaRPr lang="fr-FR" sz="7000" dirty="0">
+              <a:latin typeface="Impact" panose="020B0806030902050204" pitchFamily="34" charset="0"/>
+            </a:endParaRPr>
+          </a:p>
+        </p:txBody>
+      </p:sp>
+      <p:pic>
+        <p:nvPicPr>
+          <p:cNvPr id="4" name="Picture 3" descr="A picture containing text&#10;&#10;Description automatically generated">
+            <a:extLst>
+              <a:ext uri="{FF2B5EF4-FFF2-40B4-BE49-F238E27FC236}">
+                <a16:creationId xmlns:a16="http://schemas.microsoft.com/office/drawing/2014/main" id="{9D000AC4-982B-4F48-8220-86B87008D666}"/>
+              </a:ext>
+            </a:extLst>
+          </p:cNvPr>
+          <p:cNvPicPr>
+            <a:picLocks noChangeAspect="1"/>
+          </p:cNvPicPr>
+          <p:nvPr/>
+        </p:nvPicPr>
+        <p:blipFill>
+          <a:blip r:embed="rId3">
+            <a:extLst>
+              <a:ext uri="{28A0092B-C50C-407E-A947-70E740481C1C}">
+                <a14:useLocalDpi xmlns:a14="http://schemas.microsoft.com/office/drawing/2010/main" val="0"/>
+              </a:ext>
+            </a:extLst>
+          </a:blip>
+          <a:stretch>
+            <a:fillRect/>
+          </a:stretch>
+        </p:blipFill>
+        <p:spPr>
+          <a:xfrm>
+            <a:off x="2702719" y="1325563"/>
+            <a:ext cx="6786562" cy="5429250"/>
+          </a:xfrm>
+          <a:prstGeom prst="rect">
+            <a:avLst/>
+          </a:prstGeom>
+        </p:spPr>
+      </p:pic>
+    </p:spTree>
+    <p:extLst>
+      <p:ext uri="{BB962C8B-B14F-4D97-AF65-F5344CB8AC3E}">
+        <p14:creationId xmlns:p14="http://schemas.microsoft.com/office/powerpoint/2010/main" val="248234882"/>
+      </p:ext>
+    </p:extLst>
+  </p:cSld>
+  <p:clrMapOvr>
+    <a:masterClrMapping/>
+  </p:clrMapOvr>
+</p:sld>
+</file>
+
+<file path=ppt/slides/slide6.xml><?xml version="1.0" encoding="utf-8"?>
 <p:sld xmlns:a="http://schemas.openxmlformats.org/drawingml/2006/main" xmlns:r="http://schemas.openxmlformats.org/officeDocument/2006/relationships" xmlns:p="http://schemas.openxmlformats.org/presentationml/2006/main">
   <p:cSld>
     <p:bg>

</xml_diff>